<commit_message>
added slide to edX_Python_Course_02.pptx
</commit_message>
<xml_diff>
--- a/edX_Python_Course_02.pptx
+++ b/edX_Python_Course_02.pptx
@@ -5,7 +5,7 @@
     <p:sldMasterId id="2147483648" r:id="rId1"/>
   </p:sldMasterIdLst>
   <p:handoutMasterIdLst>
-    <p:handoutMasterId r:id="rId7"/>
+    <p:handoutMasterId r:id="rId8"/>
   </p:handoutMasterIdLst>
   <p:sldIdLst>
     <p:sldId id="256" r:id="rId2"/>
@@ -13,6 +13,7 @@
     <p:sldId id="270" r:id="rId4"/>
     <p:sldId id="271" r:id="rId5"/>
     <p:sldId id="272" r:id="rId6"/>
+    <p:sldId id="273" r:id="rId7"/>
   </p:sldIdLst>
   <p:sldSz cx="12192000" cy="6858000"/>
   <p:notesSz cx="6858000" cy="9144000"/>
@@ -3990,7 +3991,6 @@
               <a:rPr lang="cs-CZ" dirty="0"/>
               <a:t> 1</a:t>
             </a:r>
-            <a:endParaRPr lang="cs-CZ" dirty="0"/>
           </a:p>
         </p:txBody>
       </p:sp>
@@ -4551,7 +4551,6 @@
               <a:rPr lang="cs-CZ" dirty="0"/>
               <a:t> 1</a:t>
             </a:r>
-            <a:endParaRPr lang="cs-CZ" dirty="0"/>
           </a:p>
         </p:txBody>
       </p:sp>
@@ -5052,7 +5051,6 @@
               <a:rPr lang="cs-CZ" dirty="0"/>
               <a:t> 2</a:t>
             </a:r>
-            <a:endParaRPr lang="cs-CZ" dirty="0"/>
           </a:p>
         </p:txBody>
       </p:sp>
@@ -5631,6 +5629,612 @@
     <p:extLst>
       <p:ext uri="{BB962C8B-B14F-4D97-AF65-F5344CB8AC3E}">
         <p14:creationId xmlns:p14="http://schemas.microsoft.com/office/powerpoint/2010/main" val="4227994593"/>
+      </p:ext>
+    </p:extLst>
+  </p:cSld>
+  <p:clrMapOvr>
+    <a:masterClrMapping/>
+  </p:clrMapOvr>
+  <p:timing>
+    <p:tnLst>
+      <p:par>
+        <p:cTn id="1" dur="indefinite" restart="never" nodeType="tmRoot"/>
+      </p:par>
+    </p:tnLst>
+  </p:timing>
+</p:sld>
+</file>
+
+<file path=ppt/slides/slide6.xml><?xml version="1.0" encoding="utf-8"?>
+<p:sld xmlns:a="http://schemas.openxmlformats.org/drawingml/2006/main" xmlns:r="http://schemas.openxmlformats.org/officeDocument/2006/relationships" xmlns:p="http://schemas.openxmlformats.org/presentationml/2006/main">
+  <p:cSld>
+    <p:spTree>
+      <p:nvGrpSpPr>
+        <p:cNvPr id="1" name=""/>
+        <p:cNvGrpSpPr/>
+        <p:nvPr/>
+      </p:nvGrpSpPr>
+      <p:grpSpPr>
+        <a:xfrm>
+          <a:off x="0" y="0"/>
+          <a:ext cx="0" cy="0"/>
+          <a:chOff x="0" y="0"/>
+          <a:chExt cx="0" cy="0"/>
+        </a:xfrm>
+      </p:grpSpPr>
+      <p:sp>
+        <p:nvSpPr>
+          <p:cNvPr id="2" name="Nadpis 1"/>
+          <p:cNvSpPr>
+            <a:spLocks noGrp="1"/>
+          </p:cNvSpPr>
+          <p:nvPr>
+            <p:ph type="title"/>
+          </p:nvPr>
+        </p:nvSpPr>
+        <p:spPr/>
+        <p:txBody>
+          <a:bodyPr/>
+          <a:lstStyle/>
+          <a:p>
+            <a:r>
+              <a:rPr lang="cs-CZ" dirty="0" smtClean="0"/>
+              <a:t>Různé</a:t>
+            </a:r>
+            <a:endParaRPr lang="cs-CZ" dirty="0"/>
+          </a:p>
+        </p:txBody>
+      </p:sp>
+      <p:sp>
+        <p:nvSpPr>
+          <p:cNvPr id="3" name="Zástupný symbol pro obsah 2"/>
+          <p:cNvSpPr>
+            <a:spLocks noGrp="1"/>
+          </p:cNvSpPr>
+          <p:nvPr>
+            <p:ph idx="1"/>
+          </p:nvPr>
+        </p:nvSpPr>
+        <p:spPr>
+          <a:xfrm>
+            <a:off x="112644" y="895350"/>
+            <a:ext cx="5724940" cy="5823502"/>
+          </a:xfrm>
+        </p:spPr>
+        <p:txBody>
+          <a:bodyPr>
+            <a:normAutofit/>
+          </a:bodyPr>
+          <a:lstStyle/>
+          <a:p>
+            <a:r>
+              <a:rPr lang="cs-CZ" dirty="0" err="1" smtClean="0"/>
+              <a:t>ipython</a:t>
+            </a:r>
+            <a:endParaRPr lang="cs-CZ" dirty="0" smtClean="0"/>
+          </a:p>
+          <a:p>
+            <a:pPr lvl="1"/>
+            <a:r>
+              <a:rPr lang="cs-CZ" dirty="0" smtClean="0"/>
+              <a:t>$ ipython3.6eve</a:t>
+            </a:r>
+          </a:p>
+          <a:p>
+            <a:pPr lvl="1"/>
+            <a:r>
+              <a:rPr lang="cs-CZ" dirty="0" smtClean="0"/>
+              <a:t>Lepší python konsole než "python"</a:t>
+            </a:r>
+          </a:p>
+          <a:p>
+            <a:pPr lvl="1"/>
+            <a:r>
+              <a:rPr lang="cs-CZ" dirty="0" smtClean="0"/>
+              <a:t>Obsahuje klasické BASH funkce</a:t>
+            </a:r>
+          </a:p>
+          <a:p>
+            <a:pPr lvl="2"/>
+            <a:r>
+              <a:rPr lang="cs-CZ" dirty="0" err="1" smtClean="0"/>
+              <a:t>ls</a:t>
+            </a:r>
+            <a:r>
+              <a:rPr lang="cs-CZ" dirty="0" smtClean="0"/>
+              <a:t>, </a:t>
+            </a:r>
+            <a:r>
+              <a:rPr lang="cs-CZ" dirty="0" err="1" smtClean="0"/>
+              <a:t>ls</a:t>
+            </a:r>
+            <a:r>
+              <a:rPr lang="cs-CZ" dirty="0" smtClean="0"/>
+              <a:t> -l, </a:t>
+            </a:r>
+            <a:r>
+              <a:rPr lang="cs-CZ" dirty="0" err="1" smtClean="0"/>
+              <a:t>pwd</a:t>
+            </a:r>
+            <a:r>
+              <a:rPr lang="cs-CZ" dirty="0" smtClean="0"/>
+              <a:t>, </a:t>
+            </a:r>
+            <a:r>
+              <a:rPr lang="cs-CZ" dirty="0" err="1" smtClean="0"/>
+              <a:t>df</a:t>
+            </a:r>
+            <a:r>
+              <a:rPr lang="cs-CZ" dirty="0" smtClean="0"/>
+              <a:t>, </a:t>
+            </a:r>
+            <a:r>
+              <a:rPr lang="cs-CZ" dirty="0" err="1" smtClean="0"/>
+              <a:t>du</a:t>
+            </a:r>
+            <a:r>
+              <a:rPr lang="cs-CZ" dirty="0" smtClean="0"/>
+              <a:t>,</a:t>
+            </a:r>
+          </a:p>
+          <a:p>
+            <a:pPr lvl="2"/>
+            <a:r>
+              <a:rPr lang="cs-CZ" dirty="0" smtClean="0"/>
+              <a:t>Jakékoli s přidáním !</a:t>
+            </a:r>
+          </a:p>
+          <a:p>
+            <a:pPr lvl="3"/>
+            <a:r>
+              <a:rPr lang="cs-CZ" dirty="0" smtClean="0"/>
+              <a:t>!</a:t>
+            </a:r>
+            <a:r>
+              <a:rPr lang="cs-CZ" dirty="0" err="1" smtClean="0"/>
+              <a:t>who</a:t>
+            </a:r>
+            <a:endParaRPr lang="cs-CZ" dirty="0" smtClean="0"/>
+          </a:p>
+          <a:p>
+            <a:pPr lvl="3"/>
+            <a:r>
+              <a:rPr lang="cs-CZ" dirty="0" smtClean="0"/>
+              <a:t>!</a:t>
+            </a:r>
+            <a:r>
+              <a:rPr lang="cs-CZ" dirty="0" err="1" smtClean="0"/>
+              <a:t>du</a:t>
+            </a:r>
+            <a:endParaRPr lang="cs-CZ" dirty="0" smtClean="0"/>
+          </a:p>
+          <a:p>
+            <a:pPr lvl="3"/>
+            <a:r>
+              <a:rPr lang="cs-CZ" dirty="0" smtClean="0"/>
+              <a:t>!</a:t>
+            </a:r>
+            <a:r>
+              <a:rPr lang="cs-CZ" dirty="0" err="1" smtClean="0"/>
+              <a:t>df</a:t>
+            </a:r>
+            <a:r>
+              <a:rPr lang="cs-CZ" dirty="0" smtClean="0"/>
+              <a:t> -h</a:t>
+            </a:r>
+          </a:p>
+          <a:p>
+            <a:pPr lvl="3"/>
+            <a:r>
+              <a:rPr lang="cs-CZ" dirty="0" smtClean="0"/>
+              <a:t>!</a:t>
+            </a:r>
+            <a:r>
+              <a:rPr lang="cs-CZ" dirty="0" err="1" smtClean="0"/>
+              <a:t>rsync</a:t>
+            </a:r>
+            <a:endParaRPr lang="cs-CZ" dirty="0" smtClean="0"/>
+          </a:p>
+          <a:p>
+            <a:pPr lvl="3"/>
+            <a:r>
+              <a:rPr lang="cs-CZ" dirty="0" err="1" smtClean="0"/>
+              <a:t>atd</a:t>
+            </a:r>
+            <a:endParaRPr lang="cs-CZ" dirty="0"/>
+          </a:p>
+          <a:p>
+            <a:pPr lvl="1"/>
+            <a:r>
+              <a:rPr lang="cs-CZ" dirty="0" smtClean="0"/>
+              <a:t>O dost lepší formát funkcí</a:t>
+            </a:r>
+          </a:p>
+          <a:p>
+            <a:pPr lvl="1"/>
+            <a:endParaRPr lang="cs-CZ" dirty="0"/>
+          </a:p>
+          <a:p>
+            <a:pPr lvl="1"/>
+            <a:r>
+              <a:rPr lang="cs-CZ" dirty="0" err="1" smtClean="0"/>
+              <a:t>magic</a:t>
+            </a:r>
+            <a:r>
+              <a:rPr lang="cs-CZ" dirty="0" smtClean="0"/>
+              <a:t> metody. Možná příště</a:t>
+            </a:r>
+          </a:p>
+          <a:p>
+            <a:pPr lvl="1"/>
+            <a:r>
+              <a:rPr lang="cs-CZ" dirty="0" smtClean="0"/>
+              <a:t>(časování, lepší vypsání, notebook)</a:t>
+            </a:r>
+            <a:endParaRPr lang="cs-CZ" dirty="0" smtClean="0"/>
+          </a:p>
+        </p:txBody>
+      </p:sp>
+      <p:sp>
+        <p:nvSpPr>
+          <p:cNvPr id="7" name="Zástupný symbol pro obsah 2"/>
+          <p:cNvSpPr txBox="1">
+            <a:spLocks/>
+          </p:cNvSpPr>
+          <p:nvPr/>
+        </p:nvSpPr>
+        <p:spPr>
+          <a:xfrm>
+            <a:off x="6261653" y="895350"/>
+            <a:ext cx="5724940" cy="5823502"/>
+          </a:xfrm>
+          <a:prstGeom prst="rect">
+            <a:avLst/>
+          </a:prstGeom>
+        </p:spPr>
+        <p:txBody>
+          <a:bodyPr vert="horz" lIns="91440" tIns="45720" rIns="91440" bIns="45720" rtlCol="0">
+            <a:normAutofit/>
+          </a:bodyPr>
+          <a:lstStyle>
+            <a:lvl1pPr marL="228600" indent="-228600" algn="l" defTabSz="914400" rtl="0" eaLnBrk="1" latinLnBrk="0" hangingPunct="1">
+              <a:lnSpc>
+                <a:spcPct val="90000"/>
+              </a:lnSpc>
+              <a:spcBef>
+                <a:spcPts val="1000"/>
+              </a:spcBef>
+              <a:buFont typeface="Arial" panose="020B0604020202020204" pitchFamily="34" charset="0"/>
+              <a:buChar char="•"/>
+              <a:defRPr sz="2800" kern="1200">
+                <a:solidFill>
+                  <a:schemeClr val="tx1"/>
+                </a:solidFill>
+                <a:latin typeface="+mn-lt"/>
+                <a:ea typeface="+mn-ea"/>
+                <a:cs typeface="+mn-cs"/>
+              </a:defRPr>
+            </a:lvl1pPr>
+            <a:lvl2pPr marL="685800" indent="-228600" algn="l" defTabSz="914400" rtl="0" eaLnBrk="1" latinLnBrk="0" hangingPunct="1">
+              <a:lnSpc>
+                <a:spcPct val="90000"/>
+              </a:lnSpc>
+              <a:spcBef>
+                <a:spcPts val="500"/>
+              </a:spcBef>
+              <a:buFont typeface="Arial" panose="020B0604020202020204" pitchFamily="34" charset="0"/>
+              <a:buChar char="•"/>
+              <a:defRPr sz="2400" kern="1200">
+                <a:solidFill>
+                  <a:schemeClr val="tx1"/>
+                </a:solidFill>
+                <a:latin typeface="+mn-lt"/>
+                <a:ea typeface="+mn-ea"/>
+                <a:cs typeface="+mn-cs"/>
+              </a:defRPr>
+            </a:lvl2pPr>
+            <a:lvl3pPr marL="1143000" indent="-228600" algn="l" defTabSz="914400" rtl="0" eaLnBrk="1" latinLnBrk="0" hangingPunct="1">
+              <a:lnSpc>
+                <a:spcPct val="90000"/>
+              </a:lnSpc>
+              <a:spcBef>
+                <a:spcPts val="500"/>
+              </a:spcBef>
+              <a:buFont typeface="Arial" panose="020B0604020202020204" pitchFamily="34" charset="0"/>
+              <a:buChar char="•"/>
+              <a:defRPr sz="2000" kern="1200">
+                <a:solidFill>
+                  <a:schemeClr val="tx1"/>
+                </a:solidFill>
+                <a:latin typeface="+mn-lt"/>
+                <a:ea typeface="+mn-ea"/>
+                <a:cs typeface="+mn-cs"/>
+              </a:defRPr>
+            </a:lvl3pPr>
+            <a:lvl4pPr marL="1600200" indent="-228600" algn="l" defTabSz="914400" rtl="0" eaLnBrk="1" latinLnBrk="0" hangingPunct="1">
+              <a:lnSpc>
+                <a:spcPct val="90000"/>
+              </a:lnSpc>
+              <a:spcBef>
+                <a:spcPts val="500"/>
+              </a:spcBef>
+              <a:buFont typeface="Arial" panose="020B0604020202020204" pitchFamily="34" charset="0"/>
+              <a:buChar char="•"/>
+              <a:defRPr sz="1800" kern="1200">
+                <a:solidFill>
+                  <a:schemeClr val="tx1"/>
+                </a:solidFill>
+                <a:latin typeface="+mn-lt"/>
+                <a:ea typeface="+mn-ea"/>
+                <a:cs typeface="+mn-cs"/>
+              </a:defRPr>
+            </a:lvl4pPr>
+            <a:lvl5pPr marL="2057400" indent="-228600" algn="l" defTabSz="914400" rtl="0" eaLnBrk="1" latinLnBrk="0" hangingPunct="1">
+              <a:lnSpc>
+                <a:spcPct val="90000"/>
+              </a:lnSpc>
+              <a:spcBef>
+                <a:spcPts val="500"/>
+              </a:spcBef>
+              <a:buFont typeface="Arial" panose="020B0604020202020204" pitchFamily="34" charset="0"/>
+              <a:buChar char="•"/>
+              <a:defRPr sz="1800" kern="1200">
+                <a:solidFill>
+                  <a:schemeClr val="tx1"/>
+                </a:solidFill>
+                <a:latin typeface="+mn-lt"/>
+                <a:ea typeface="+mn-ea"/>
+                <a:cs typeface="+mn-cs"/>
+              </a:defRPr>
+            </a:lvl5pPr>
+            <a:lvl6pPr marL="2514600" indent="-228600" algn="l" defTabSz="914400" rtl="0" eaLnBrk="1" latinLnBrk="0" hangingPunct="1">
+              <a:lnSpc>
+                <a:spcPct val="90000"/>
+              </a:lnSpc>
+              <a:spcBef>
+                <a:spcPts val="500"/>
+              </a:spcBef>
+              <a:buFont typeface="Arial" panose="020B0604020202020204" pitchFamily="34" charset="0"/>
+              <a:buChar char="•"/>
+              <a:defRPr sz="1800" kern="1200">
+                <a:solidFill>
+                  <a:schemeClr val="tx1"/>
+                </a:solidFill>
+                <a:latin typeface="+mn-lt"/>
+                <a:ea typeface="+mn-ea"/>
+                <a:cs typeface="+mn-cs"/>
+              </a:defRPr>
+            </a:lvl6pPr>
+            <a:lvl7pPr marL="2971800" indent="-228600" algn="l" defTabSz="914400" rtl="0" eaLnBrk="1" latinLnBrk="0" hangingPunct="1">
+              <a:lnSpc>
+                <a:spcPct val="90000"/>
+              </a:lnSpc>
+              <a:spcBef>
+                <a:spcPts val="500"/>
+              </a:spcBef>
+              <a:buFont typeface="Arial" panose="020B0604020202020204" pitchFamily="34" charset="0"/>
+              <a:buChar char="•"/>
+              <a:defRPr sz="1800" kern="1200">
+                <a:solidFill>
+                  <a:schemeClr val="tx1"/>
+                </a:solidFill>
+                <a:latin typeface="+mn-lt"/>
+                <a:ea typeface="+mn-ea"/>
+                <a:cs typeface="+mn-cs"/>
+              </a:defRPr>
+            </a:lvl7pPr>
+            <a:lvl8pPr marL="3429000" indent="-228600" algn="l" defTabSz="914400" rtl="0" eaLnBrk="1" latinLnBrk="0" hangingPunct="1">
+              <a:lnSpc>
+                <a:spcPct val="90000"/>
+              </a:lnSpc>
+              <a:spcBef>
+                <a:spcPts val="500"/>
+              </a:spcBef>
+              <a:buFont typeface="Arial" panose="020B0604020202020204" pitchFamily="34" charset="0"/>
+              <a:buChar char="•"/>
+              <a:defRPr sz="1800" kern="1200">
+                <a:solidFill>
+                  <a:schemeClr val="tx1"/>
+                </a:solidFill>
+                <a:latin typeface="+mn-lt"/>
+                <a:ea typeface="+mn-ea"/>
+                <a:cs typeface="+mn-cs"/>
+              </a:defRPr>
+            </a:lvl8pPr>
+            <a:lvl9pPr marL="3886200" indent="-228600" algn="l" defTabSz="914400" rtl="0" eaLnBrk="1" latinLnBrk="0" hangingPunct="1">
+              <a:lnSpc>
+                <a:spcPct val="90000"/>
+              </a:lnSpc>
+              <a:spcBef>
+                <a:spcPts val="500"/>
+              </a:spcBef>
+              <a:buFont typeface="Arial" panose="020B0604020202020204" pitchFamily="34" charset="0"/>
+              <a:buChar char="•"/>
+              <a:defRPr sz="1800" kern="1200">
+                <a:solidFill>
+                  <a:schemeClr val="tx1"/>
+                </a:solidFill>
+                <a:latin typeface="+mn-lt"/>
+                <a:ea typeface="+mn-ea"/>
+                <a:cs typeface="+mn-cs"/>
+              </a:defRPr>
+            </a:lvl9pPr>
+          </a:lstStyle>
+          <a:p>
+            <a:r>
+              <a:rPr lang="cs-CZ" dirty="0" smtClean="0"/>
+              <a:t>pip</a:t>
+            </a:r>
+          </a:p>
+          <a:p>
+            <a:pPr lvl="1"/>
+            <a:r>
+              <a:rPr lang="cs-CZ" dirty="0" smtClean="0"/>
+              <a:t>Instalace knihoven</a:t>
+            </a:r>
+          </a:p>
+          <a:p>
+            <a:pPr lvl="1"/>
+            <a:r>
+              <a:rPr lang="cs-CZ" dirty="0" smtClean="0"/>
+              <a:t>čerpá z: (</a:t>
+            </a:r>
+            <a:r>
+              <a:rPr lang="cs-CZ" dirty="0" err="1" smtClean="0"/>
+              <a:t>google</a:t>
+            </a:r>
+            <a:r>
+              <a:rPr lang="cs-CZ" dirty="0" smtClean="0"/>
+              <a:t> - pip</a:t>
+            </a:r>
+            <a:r>
+              <a:rPr lang="cs-CZ" dirty="0"/>
+              <a:t>) … </a:t>
+            </a:r>
+            <a:r>
+              <a:rPr lang="cs-CZ" dirty="0">
+                <a:hlinkClick r:id="rId2"/>
+              </a:rPr>
+              <a:t>https://pypi.org/project/pip</a:t>
+            </a:r>
+            <a:r>
+              <a:rPr lang="cs-CZ" dirty="0" smtClean="0">
+                <a:hlinkClick r:id="rId2"/>
+              </a:rPr>
+              <a:t>/</a:t>
+            </a:r>
+            <a:r>
+              <a:rPr lang="cs-CZ" dirty="0" smtClean="0"/>
+              <a:t> </a:t>
+            </a:r>
+          </a:p>
+          <a:p>
+            <a:pPr lvl="1"/>
+            <a:r>
+              <a:rPr lang="cs-CZ" dirty="0" smtClean="0"/>
+              <a:t>knihovny - podpůrné již napsané funkce</a:t>
+            </a:r>
+          </a:p>
+          <a:p>
+            <a:pPr lvl="1"/>
+            <a:r>
+              <a:rPr lang="cs-CZ" dirty="0" err="1" smtClean="0"/>
+              <a:t>matplotlib</a:t>
+            </a:r>
+            <a:endParaRPr lang="cs-CZ" dirty="0"/>
+          </a:p>
+          <a:p>
+            <a:pPr lvl="1"/>
+            <a:endParaRPr lang="cs-CZ" dirty="0" smtClean="0"/>
+          </a:p>
+          <a:p>
+            <a:pPr lvl="1"/>
+            <a:endParaRPr lang="cs-CZ" dirty="0" smtClean="0"/>
+          </a:p>
+          <a:p>
+            <a:pPr lvl="1"/>
+            <a:r>
+              <a:rPr lang="cs-CZ" dirty="0" err="1" smtClean="0"/>
+              <a:t>numpy</a:t>
+            </a:r>
+            <a:r>
+              <a:rPr lang="cs-CZ" dirty="0" smtClean="0"/>
+              <a:t>, </a:t>
+            </a:r>
+            <a:r>
+              <a:rPr lang="cs-CZ" dirty="0" err="1" smtClean="0"/>
+              <a:t>pandas</a:t>
+            </a:r>
+            <a:r>
+              <a:rPr lang="cs-CZ" dirty="0" smtClean="0"/>
+              <a:t> … práce s čísly, maticemi, tabulkami</a:t>
+            </a:r>
+          </a:p>
+          <a:p>
+            <a:pPr lvl="1"/>
+            <a:endParaRPr lang="cs-CZ" dirty="0"/>
+          </a:p>
+          <a:p>
+            <a:pPr lvl="1"/>
+            <a:r>
+              <a:rPr lang="cs-CZ" dirty="0" err="1" smtClean="0"/>
+              <a:t>requests</a:t>
+            </a:r>
+            <a:r>
+              <a:rPr lang="cs-CZ" dirty="0" smtClean="0"/>
+              <a:t> … práce s internetem</a:t>
+            </a:r>
+          </a:p>
+          <a:p>
+            <a:pPr lvl="1"/>
+            <a:r>
+              <a:rPr lang="cs-CZ" dirty="0" err="1" smtClean="0"/>
+              <a:t>pytorch</a:t>
+            </a:r>
+            <a:r>
+              <a:rPr lang="cs-CZ" dirty="0" smtClean="0"/>
+              <a:t> … práce s </a:t>
+            </a:r>
+            <a:r>
+              <a:rPr lang="cs-CZ" dirty="0" err="1" smtClean="0"/>
+              <a:t>Machine</a:t>
+            </a:r>
+            <a:r>
+              <a:rPr lang="cs-CZ" dirty="0" smtClean="0"/>
+              <a:t> </a:t>
+            </a:r>
+            <a:r>
+              <a:rPr lang="cs-CZ" dirty="0" err="1" smtClean="0"/>
+              <a:t>Learning</a:t>
+            </a:r>
+            <a:endParaRPr lang="cs-CZ" dirty="0" smtClean="0"/>
+          </a:p>
+          <a:p>
+            <a:pPr lvl="1"/>
+            <a:r>
+              <a:rPr lang="cs-CZ" dirty="0" err="1" smtClean="0"/>
+              <a:t>flask</a:t>
+            </a:r>
+            <a:r>
+              <a:rPr lang="cs-CZ" dirty="0" smtClean="0"/>
+              <a:t> … vytvoření webové aplikace</a:t>
+            </a:r>
+            <a:endParaRPr lang="cs-CZ" dirty="0"/>
+          </a:p>
+          <a:p>
+            <a:pPr lvl="1"/>
+            <a:endParaRPr lang="cs-CZ" dirty="0" smtClean="0"/>
+          </a:p>
+        </p:txBody>
+      </p:sp>
+      <p:pic>
+        <p:nvPicPr>
+          <p:cNvPr id="4" name="Obrázek 3"/>
+          <p:cNvPicPr>
+            <a:picLocks noChangeAspect="1"/>
+          </p:cNvPicPr>
+          <p:nvPr/>
+        </p:nvPicPr>
+        <p:blipFill>
+          <a:blip r:embed="rId3"/>
+          <a:stretch>
+            <a:fillRect/>
+          </a:stretch>
+        </p:blipFill>
+        <p:spPr>
+          <a:xfrm>
+            <a:off x="8392468" y="3214223"/>
+            <a:ext cx="3461603" cy="1015798"/>
+          </a:xfrm>
+          <a:prstGeom prst="rect">
+            <a:avLst/>
+          </a:prstGeom>
+        </p:spPr>
+      </p:pic>
+    </p:spTree>
+    <p:extLst>
+      <p:ext uri="{BB962C8B-B14F-4D97-AF65-F5344CB8AC3E}">
+        <p14:creationId xmlns:p14="http://schemas.microsoft.com/office/powerpoint/2010/main" val="3409643495"/>
       </p:ext>
     </p:extLst>
   </p:cSld>

</xml_diff>